<commit_message>
Implementing Vector Time Stamps
</commit_message>
<xml_diff>
--- a/res/FP System Design.pptx
+++ b/res/FP System Design.pptx
@@ -260,7 +260,7 @@
           <a:p>
             <a:fld id="{B1CCB4E0-D40F-45FB-ADF3-D883CB857B30}" type="datetimeFigureOut">
               <a:rPr lang="en-US" smtClean="0"/>
-              <a:t>10/28/2022</a:t>
+              <a:t>12/12/2022</a:t>
             </a:fld>
             <a:endParaRPr lang="en-US"/>
           </a:p>
@@ -458,7 +458,7 @@
           <a:p>
             <a:fld id="{B1CCB4E0-D40F-45FB-ADF3-D883CB857B30}" type="datetimeFigureOut">
               <a:rPr lang="en-US" smtClean="0"/>
-              <a:t>10/28/2022</a:t>
+              <a:t>12/12/2022</a:t>
             </a:fld>
             <a:endParaRPr lang="en-US"/>
           </a:p>
@@ -666,7 +666,7 @@
           <a:p>
             <a:fld id="{B1CCB4E0-D40F-45FB-ADF3-D883CB857B30}" type="datetimeFigureOut">
               <a:rPr lang="en-US" smtClean="0"/>
-              <a:t>10/28/2022</a:t>
+              <a:t>12/12/2022</a:t>
             </a:fld>
             <a:endParaRPr lang="en-US"/>
           </a:p>
@@ -864,7 +864,7 @@
           <a:p>
             <a:fld id="{B1CCB4E0-D40F-45FB-ADF3-D883CB857B30}" type="datetimeFigureOut">
               <a:rPr lang="en-US" smtClean="0"/>
-              <a:t>10/28/2022</a:t>
+              <a:t>12/12/2022</a:t>
             </a:fld>
             <a:endParaRPr lang="en-US"/>
           </a:p>
@@ -1139,7 +1139,7 @@
           <a:p>
             <a:fld id="{B1CCB4E0-D40F-45FB-ADF3-D883CB857B30}" type="datetimeFigureOut">
               <a:rPr lang="en-US" smtClean="0"/>
-              <a:t>10/28/2022</a:t>
+              <a:t>12/12/2022</a:t>
             </a:fld>
             <a:endParaRPr lang="en-US"/>
           </a:p>
@@ -1404,7 +1404,7 @@
           <a:p>
             <a:fld id="{B1CCB4E0-D40F-45FB-ADF3-D883CB857B30}" type="datetimeFigureOut">
               <a:rPr lang="en-US" smtClean="0"/>
-              <a:t>10/28/2022</a:t>
+              <a:t>12/12/2022</a:t>
             </a:fld>
             <a:endParaRPr lang="en-US"/>
           </a:p>
@@ -1816,7 +1816,7 @@
           <a:p>
             <a:fld id="{B1CCB4E0-D40F-45FB-ADF3-D883CB857B30}" type="datetimeFigureOut">
               <a:rPr lang="en-US" smtClean="0"/>
-              <a:t>10/28/2022</a:t>
+              <a:t>12/12/2022</a:t>
             </a:fld>
             <a:endParaRPr lang="en-US"/>
           </a:p>
@@ -1957,7 +1957,7 @@
           <a:p>
             <a:fld id="{B1CCB4E0-D40F-45FB-ADF3-D883CB857B30}" type="datetimeFigureOut">
               <a:rPr lang="en-US" smtClean="0"/>
-              <a:t>10/28/2022</a:t>
+              <a:t>12/12/2022</a:t>
             </a:fld>
             <a:endParaRPr lang="en-US"/>
           </a:p>
@@ -2070,7 +2070,7 @@
           <a:p>
             <a:fld id="{B1CCB4E0-D40F-45FB-ADF3-D883CB857B30}" type="datetimeFigureOut">
               <a:rPr lang="en-US" smtClean="0"/>
-              <a:t>10/28/2022</a:t>
+              <a:t>12/12/2022</a:t>
             </a:fld>
             <a:endParaRPr lang="en-US"/>
           </a:p>
@@ -2381,7 +2381,7 @@
           <a:p>
             <a:fld id="{B1CCB4E0-D40F-45FB-ADF3-D883CB857B30}" type="datetimeFigureOut">
               <a:rPr lang="en-US" smtClean="0"/>
-              <a:t>10/28/2022</a:t>
+              <a:t>12/12/2022</a:t>
             </a:fld>
             <a:endParaRPr lang="en-US"/>
           </a:p>
@@ -2669,7 +2669,7 @@
           <a:p>
             <a:fld id="{B1CCB4E0-D40F-45FB-ADF3-D883CB857B30}" type="datetimeFigureOut">
               <a:rPr lang="en-US" smtClean="0"/>
-              <a:t>10/28/2022</a:t>
+              <a:t>12/12/2022</a:t>
             </a:fld>
             <a:endParaRPr lang="en-US"/>
           </a:p>
@@ -2910,7 +2910,7 @@
           <a:p>
             <a:fld id="{B1CCB4E0-D40F-45FB-ADF3-D883CB857B30}" type="datetimeFigureOut">
               <a:rPr lang="en-US" smtClean="0"/>
-              <a:t>10/28/2022</a:t>
+              <a:t>12/12/2022</a:t>
             </a:fld>
             <a:endParaRPr lang="en-US"/>
           </a:p>
@@ -3341,7 +3341,7 @@
         </p:nvSpPr>
         <p:spPr>
           <a:xfrm>
-            <a:off x="377955" y="2897776"/>
+            <a:off x="377955" y="815528"/>
             <a:ext cx="1828800" cy="1110343"/>
           </a:xfrm>
           <a:prstGeom prst="roundRect">
@@ -3388,162 +3388,6 @@
       </p:sp>
       <p:sp>
         <p:nvSpPr>
-          <p:cNvPr id="13" name="Oval 12">
-            <a:extLst>
-              <a:ext uri="{FF2B5EF4-FFF2-40B4-BE49-F238E27FC236}">
-                <a16:creationId xmlns:a16="http://schemas.microsoft.com/office/drawing/2014/main" id="{674E7D9B-F2A8-F5F8-FEAC-D560EA6B721B}"/>
-              </a:ext>
-            </a:extLst>
-          </p:cNvPr>
-          <p:cNvSpPr/>
-          <p:nvPr/>
-        </p:nvSpPr>
-        <p:spPr>
-          <a:xfrm>
-            <a:off x="3377684" y="3927352"/>
-            <a:ext cx="495300" cy="485386"/>
-          </a:xfrm>
-          <a:prstGeom prst="ellipse">
-            <a:avLst/>
-          </a:prstGeom>
-          <a:noFill/>
-          <a:ln w="31750">
-            <a:solidFill>
-              <a:schemeClr val="tx1"/>
-            </a:solidFill>
-          </a:ln>
-        </p:spPr>
-        <p:style>
-          <a:lnRef idx="2">
-            <a:schemeClr val="accent1">
-              <a:shade val="50000"/>
-            </a:schemeClr>
-          </a:lnRef>
-          <a:fillRef idx="1">
-            <a:schemeClr val="accent1"/>
-          </a:fillRef>
-          <a:effectRef idx="0">
-            <a:schemeClr val="accent1"/>
-          </a:effectRef>
-          <a:fontRef idx="minor">
-            <a:schemeClr val="lt1"/>
-          </a:fontRef>
-        </p:style>
-        <p:txBody>
-          <a:bodyPr rtlCol="0" anchor="ctr"/>
-          <a:lstStyle/>
-          <a:p>
-            <a:pPr algn="ctr"/>
-            <a:endParaRPr lang="en-US"/>
-          </a:p>
-        </p:txBody>
-      </p:sp>
-      <p:sp>
-        <p:nvSpPr>
-          <p:cNvPr id="14" name="Oval 13">
-            <a:extLst>
-              <a:ext uri="{FF2B5EF4-FFF2-40B4-BE49-F238E27FC236}">
-                <a16:creationId xmlns:a16="http://schemas.microsoft.com/office/drawing/2014/main" id="{89F6620E-1C2C-73E5-93B6-BA9705EA9534}"/>
-              </a:ext>
-            </a:extLst>
-          </p:cNvPr>
-          <p:cNvSpPr/>
-          <p:nvPr/>
-        </p:nvSpPr>
-        <p:spPr>
-          <a:xfrm>
-            <a:off x="3377684" y="1836809"/>
-            <a:ext cx="495300" cy="485386"/>
-          </a:xfrm>
-          <a:prstGeom prst="ellipse">
-            <a:avLst/>
-          </a:prstGeom>
-          <a:noFill/>
-          <a:ln w="31750">
-            <a:solidFill>
-              <a:schemeClr val="tx1"/>
-            </a:solidFill>
-          </a:ln>
-        </p:spPr>
-        <p:style>
-          <a:lnRef idx="2">
-            <a:schemeClr val="accent1">
-              <a:shade val="50000"/>
-            </a:schemeClr>
-          </a:lnRef>
-          <a:fillRef idx="1">
-            <a:schemeClr val="accent1"/>
-          </a:fillRef>
-          <a:effectRef idx="0">
-            <a:schemeClr val="accent1"/>
-          </a:effectRef>
-          <a:fontRef idx="minor">
-            <a:schemeClr val="lt1"/>
-          </a:fontRef>
-        </p:style>
-        <p:txBody>
-          <a:bodyPr rtlCol="0" anchor="ctr"/>
-          <a:lstStyle/>
-          <a:p>
-            <a:pPr algn="ctr"/>
-            <a:endParaRPr lang="en-US"/>
-          </a:p>
-        </p:txBody>
-      </p:sp>
-      <p:sp>
-        <p:nvSpPr>
-          <p:cNvPr id="15" name="Oval 14">
-            <a:extLst>
-              <a:ext uri="{FF2B5EF4-FFF2-40B4-BE49-F238E27FC236}">
-                <a16:creationId xmlns:a16="http://schemas.microsoft.com/office/drawing/2014/main" id="{8E3D1B1E-0276-B51B-321B-C5B445FCC2E6}"/>
-              </a:ext>
-            </a:extLst>
-          </p:cNvPr>
-          <p:cNvSpPr/>
-          <p:nvPr/>
-        </p:nvSpPr>
-        <p:spPr>
-          <a:xfrm>
-            <a:off x="3377684" y="2964972"/>
-            <a:ext cx="495300" cy="485386"/>
-          </a:xfrm>
-          <a:prstGeom prst="ellipse">
-            <a:avLst/>
-          </a:prstGeom>
-          <a:noFill/>
-          <a:ln w="31750">
-            <a:solidFill>
-              <a:schemeClr val="tx1"/>
-            </a:solidFill>
-          </a:ln>
-        </p:spPr>
-        <p:style>
-          <a:lnRef idx="2">
-            <a:schemeClr val="accent1">
-              <a:shade val="50000"/>
-            </a:schemeClr>
-          </a:lnRef>
-          <a:fillRef idx="1">
-            <a:schemeClr val="accent1"/>
-          </a:fillRef>
-          <a:effectRef idx="0">
-            <a:schemeClr val="accent1"/>
-          </a:effectRef>
-          <a:fontRef idx="minor">
-            <a:schemeClr val="lt1"/>
-          </a:fontRef>
-        </p:style>
-        <p:txBody>
-          <a:bodyPr rtlCol="0" anchor="ctr"/>
-          <a:lstStyle/>
-          <a:p>
-            <a:pPr algn="ctr"/>
-            <a:endParaRPr lang="en-US"/>
-          </a:p>
-        </p:txBody>
-      </p:sp>
-      <p:sp>
-        <p:nvSpPr>
           <p:cNvPr id="17" name="Rectangle: Rounded Corners 16">
             <a:extLst>
               <a:ext uri="{FF2B5EF4-FFF2-40B4-BE49-F238E27FC236}">
@@ -3738,7 +3582,7 @@
         </p:nvSpPr>
         <p:spPr>
           <a:xfrm>
-            <a:off x="10056365" y="4407353"/>
+            <a:off x="10056365" y="5480567"/>
             <a:ext cx="1828800" cy="1110343"/>
           </a:xfrm>
           <a:prstGeom prst="roundRect">
@@ -3783,25 +3627,155 @@
           </a:p>
         </p:txBody>
       </p:sp>
+      <p:sp>
+        <p:nvSpPr>
+          <p:cNvPr id="76" name="TextBox 75">
+            <a:extLst>
+              <a:ext uri="{FF2B5EF4-FFF2-40B4-BE49-F238E27FC236}">
+                <a16:creationId xmlns:a16="http://schemas.microsoft.com/office/drawing/2014/main" id="{9F762DCA-C235-34FF-4E0E-2CDB5C506316}"/>
+              </a:ext>
+            </a:extLst>
+          </p:cNvPr>
+          <p:cNvSpPr txBox="1"/>
+          <p:nvPr/>
+        </p:nvSpPr>
+        <p:spPr>
+          <a:xfrm>
+            <a:off x="7837014" y="3590925"/>
+            <a:ext cx="288862" cy="1569660"/>
+          </a:xfrm>
+          <a:prstGeom prst="rect">
+            <a:avLst/>
+          </a:prstGeom>
+          <a:noFill/>
+        </p:spPr>
+        <p:txBody>
+          <a:bodyPr wrap="none" rtlCol="0">
+            <a:spAutoFit/>
+          </a:bodyPr>
+          <a:lstStyle/>
+          <a:p>
+            <a:r>
+              <a:rPr lang="en-US" sz="3200" dirty="0"/>
+              <a:t>.</a:t>
+            </a:r>
+          </a:p>
+          <a:p>
+            <a:r>
+              <a:rPr lang="en-US" sz="3200" dirty="0"/>
+              <a:t>.</a:t>
+            </a:r>
+          </a:p>
+          <a:p>
+            <a:r>
+              <a:rPr lang="en-US" sz="3200" dirty="0"/>
+              <a:t>.</a:t>
+            </a:r>
+          </a:p>
+        </p:txBody>
+      </p:sp>
+      <p:sp>
+        <p:nvSpPr>
+          <p:cNvPr id="79" name="TextBox 78">
+            <a:extLst>
+              <a:ext uri="{FF2B5EF4-FFF2-40B4-BE49-F238E27FC236}">
+                <a16:creationId xmlns:a16="http://schemas.microsoft.com/office/drawing/2014/main" id="{B496E3A8-B411-4E2E-495A-8F723D850899}"/>
+              </a:ext>
+            </a:extLst>
+          </p:cNvPr>
+          <p:cNvSpPr txBox="1"/>
+          <p:nvPr/>
+        </p:nvSpPr>
+        <p:spPr>
+          <a:xfrm>
+            <a:off x="7344792" y="53342"/>
+            <a:ext cx="1220975" cy="369332"/>
+          </a:xfrm>
+          <a:prstGeom prst="rect">
+            <a:avLst/>
+          </a:prstGeom>
+          <a:noFill/>
+        </p:spPr>
+        <p:txBody>
+          <a:bodyPr wrap="none" rtlCol="0">
+            <a:spAutoFit/>
+          </a:bodyPr>
+          <a:lstStyle/>
+          <a:p>
+            <a:r>
+              <a:rPr lang="en-US" dirty="0"/>
+              <a:t>Java Spring</a:t>
+            </a:r>
+          </a:p>
+        </p:txBody>
+      </p:sp>
+      <p:sp>
+        <p:nvSpPr>
+          <p:cNvPr id="30" name="Rectangle: Rounded Corners 29">
+            <a:extLst>
+              <a:ext uri="{FF2B5EF4-FFF2-40B4-BE49-F238E27FC236}">
+                <a16:creationId xmlns:a16="http://schemas.microsoft.com/office/drawing/2014/main" id="{B0D9B4F1-3A67-FE7F-D534-F21948B67CAB}"/>
+              </a:ext>
+            </a:extLst>
+          </p:cNvPr>
+          <p:cNvSpPr/>
+          <p:nvPr/>
+        </p:nvSpPr>
+        <p:spPr>
+          <a:xfrm>
+            <a:off x="6756400" y="427345"/>
+            <a:ext cx="2397760" cy="6339215"/>
+          </a:xfrm>
+          <a:prstGeom prst="roundRect">
+            <a:avLst/>
+          </a:prstGeom>
+          <a:noFill/>
+        </p:spPr>
+        <p:style>
+          <a:lnRef idx="2">
+            <a:schemeClr val="accent1">
+              <a:shade val="50000"/>
+            </a:schemeClr>
+          </a:lnRef>
+          <a:fillRef idx="1">
+            <a:schemeClr val="accent1"/>
+          </a:fillRef>
+          <a:effectRef idx="0">
+            <a:schemeClr val="accent1"/>
+          </a:effectRef>
+          <a:fontRef idx="minor">
+            <a:schemeClr val="lt1"/>
+          </a:fontRef>
+        </p:style>
+        <p:txBody>
+          <a:bodyPr rtlCol="0" anchor="ctr"/>
+          <a:lstStyle/>
+          <a:p>
+            <a:pPr algn="ctr"/>
+            <a:endParaRPr lang="en-US"/>
+          </a:p>
+        </p:txBody>
+      </p:sp>
       <p:cxnSp>
         <p:nvCxnSpPr>
-          <p:cNvPr id="35" name="Straight Connector 34">
-            <a:extLst>
-              <a:ext uri="{FF2B5EF4-FFF2-40B4-BE49-F238E27FC236}">
-                <a16:creationId xmlns:a16="http://schemas.microsoft.com/office/drawing/2014/main" id="{6DFC1886-B263-9125-251C-95C551746C4B}"/>
+          <p:cNvPr id="61" name="Straight Connector 60">
+            <a:extLst>
+              <a:ext uri="{FF2B5EF4-FFF2-40B4-BE49-F238E27FC236}">
+                <a16:creationId xmlns:a16="http://schemas.microsoft.com/office/drawing/2014/main" id="{71B73AE6-6C37-C4F9-52DD-AADC79DA4613}"/>
               </a:ext>
             </a:extLst>
           </p:cNvPr>
           <p:cNvCxnSpPr>
             <a:cxnSpLocks/>
-            <a:endCxn id="13" idx="2"/>
+            <a:stCxn id="24" idx="1"/>
+            <a:endCxn id="20" idx="3"/>
           </p:cNvCxnSpPr>
           <p:nvPr/>
         </p:nvCxnSpPr>
         <p:spPr>
-          <a:xfrm>
-            <a:off x="2206755" y="3689164"/>
-            <a:ext cx="1170929" cy="480881"/>
+          <a:xfrm flipH="1">
+            <a:off x="8859398" y="6035739"/>
+            <a:ext cx="1196967" cy="0"/>
           </a:xfrm>
           <a:prstGeom prst="line">
             <a:avLst/>
@@ -3827,100 +3801,12 @@
           </a:fontRef>
         </p:style>
       </p:cxnSp>
-      <p:cxnSp>
-        <p:nvCxnSpPr>
-          <p:cNvPr id="38" name="Straight Connector 37">
-            <a:extLst>
-              <a:ext uri="{FF2B5EF4-FFF2-40B4-BE49-F238E27FC236}">
-                <a16:creationId xmlns:a16="http://schemas.microsoft.com/office/drawing/2014/main" id="{31B09C5A-7BF8-36F8-D996-F1B93AE8B0D6}"/>
-              </a:ext>
-            </a:extLst>
-          </p:cNvPr>
-          <p:cNvCxnSpPr>
-            <a:cxnSpLocks/>
-            <a:endCxn id="15" idx="2"/>
-          </p:cNvCxnSpPr>
-          <p:nvPr/>
-        </p:nvCxnSpPr>
-        <p:spPr>
-          <a:xfrm flipV="1">
-            <a:off x="2206755" y="3207665"/>
-            <a:ext cx="1170929" cy="4526"/>
-          </a:xfrm>
-          <a:prstGeom prst="line">
-            <a:avLst/>
-          </a:prstGeom>
-          <a:ln w="31750">
-            <a:solidFill>
-              <a:schemeClr val="tx1"/>
-            </a:solidFill>
-          </a:ln>
-        </p:spPr>
-        <p:style>
-          <a:lnRef idx="1">
-            <a:schemeClr val="accent1"/>
-          </a:lnRef>
-          <a:fillRef idx="0">
-            <a:schemeClr val="accent1"/>
-          </a:fillRef>
-          <a:effectRef idx="0">
-            <a:schemeClr val="accent1"/>
-          </a:effectRef>
-          <a:fontRef idx="minor">
-            <a:schemeClr val="tx1"/>
-          </a:fontRef>
-        </p:style>
-      </p:cxnSp>
-      <p:cxnSp>
-        <p:nvCxnSpPr>
-          <p:cNvPr id="41" name="Straight Connector 40">
-            <a:extLst>
-              <a:ext uri="{FF2B5EF4-FFF2-40B4-BE49-F238E27FC236}">
-                <a16:creationId xmlns:a16="http://schemas.microsoft.com/office/drawing/2014/main" id="{28A5A3F1-2A63-6064-E9A0-A329BFB5CFA8}"/>
-              </a:ext>
-            </a:extLst>
-          </p:cNvPr>
-          <p:cNvCxnSpPr>
-            <a:cxnSpLocks/>
-            <a:endCxn id="14" idx="3"/>
-          </p:cNvCxnSpPr>
-          <p:nvPr/>
-        </p:nvCxnSpPr>
-        <p:spPr>
-          <a:xfrm flipV="1">
-            <a:off x="2159618" y="2251112"/>
-            <a:ext cx="1290601" cy="717747"/>
-          </a:xfrm>
-          <a:prstGeom prst="line">
-            <a:avLst/>
-          </a:prstGeom>
-          <a:ln w="31750">
-            <a:solidFill>
-              <a:schemeClr val="tx1"/>
-            </a:solidFill>
-          </a:ln>
-        </p:spPr>
-        <p:style>
-          <a:lnRef idx="1">
-            <a:schemeClr val="accent1"/>
-          </a:lnRef>
-          <a:fillRef idx="0">
-            <a:schemeClr val="accent1"/>
-          </a:fillRef>
-          <a:effectRef idx="0">
-            <a:schemeClr val="accent1"/>
-          </a:effectRef>
-          <a:fontRef idx="minor">
-            <a:schemeClr val="tx1"/>
-          </a:fontRef>
-        </p:style>
-      </p:cxnSp>
-      <p:sp>
-        <p:nvSpPr>
-          <p:cNvPr id="74" name="Oval 73">
-            <a:extLst>
-              <a:ext uri="{FF2B5EF4-FFF2-40B4-BE49-F238E27FC236}">
-                <a16:creationId xmlns:a16="http://schemas.microsoft.com/office/drawing/2014/main" id="{2533196A-4864-7578-CA36-66925C8C83C1}"/>
+      <p:sp>
+        <p:nvSpPr>
+          <p:cNvPr id="68" name="Rectangle: Rounded Corners 67">
+            <a:extLst>
+              <a:ext uri="{FF2B5EF4-FFF2-40B4-BE49-F238E27FC236}">
+                <a16:creationId xmlns:a16="http://schemas.microsoft.com/office/drawing/2014/main" id="{6FD06DD7-FEFD-6495-E6EA-F715F787B7BD}"/>
               </a:ext>
             </a:extLst>
           </p:cNvPr>
@@ -3929,268 +3815,8 @@
         </p:nvSpPr>
         <p:spPr>
           <a:xfrm>
-            <a:off x="3010387" y="1045608"/>
-            <a:ext cx="1220975" cy="4324113"/>
-          </a:xfrm>
-          <a:prstGeom prst="ellipse">
-            <a:avLst/>
-          </a:prstGeom>
-          <a:noFill/>
-        </p:spPr>
-        <p:style>
-          <a:lnRef idx="2">
-            <a:schemeClr val="accent1">
-              <a:shade val="50000"/>
-            </a:schemeClr>
-          </a:lnRef>
-          <a:fillRef idx="1">
-            <a:schemeClr val="accent1"/>
-          </a:fillRef>
-          <a:effectRef idx="0">
-            <a:schemeClr val="accent1"/>
-          </a:effectRef>
-          <a:fontRef idx="minor">
-            <a:schemeClr val="lt1"/>
-          </a:fontRef>
-        </p:style>
-        <p:txBody>
-          <a:bodyPr rtlCol="0" anchor="ctr"/>
-          <a:lstStyle/>
-          <a:p>
-            <a:pPr algn="ctr"/>
-            <a:endParaRPr lang="en-US"/>
-          </a:p>
-        </p:txBody>
-      </p:sp>
-      <p:sp>
-        <p:nvSpPr>
-          <p:cNvPr id="75" name="TextBox 74">
-            <a:extLst>
-              <a:ext uri="{FF2B5EF4-FFF2-40B4-BE49-F238E27FC236}">
-                <a16:creationId xmlns:a16="http://schemas.microsoft.com/office/drawing/2014/main" id="{B6384823-CAB6-6FDA-EA14-26AB16177845}"/>
-              </a:ext>
-            </a:extLst>
-          </p:cNvPr>
-          <p:cNvSpPr txBox="1"/>
-          <p:nvPr/>
-        </p:nvSpPr>
-        <p:spPr>
-          <a:xfrm flipH="1">
-            <a:off x="2479857" y="574894"/>
-            <a:ext cx="2529336" cy="369332"/>
-          </a:xfrm>
-          <a:prstGeom prst="rect">
-            <a:avLst/>
-          </a:prstGeom>
-          <a:noFill/>
-        </p:spPr>
-        <p:txBody>
-          <a:bodyPr wrap="square" rtlCol="0">
-            <a:spAutoFit/>
-          </a:bodyPr>
-          <a:lstStyle/>
-          <a:p>
-            <a:r>
-              <a:rPr lang="en-US" dirty="0"/>
-              <a:t>React </a:t>
-            </a:r>
-            <a:r>
-              <a:rPr lang="en-US" dirty="0" err="1"/>
-              <a:t>MicroServices</a:t>
-            </a:r>
-            <a:endParaRPr lang="en-US" dirty="0"/>
-          </a:p>
-        </p:txBody>
-      </p:sp>
-      <p:sp>
-        <p:nvSpPr>
-          <p:cNvPr id="76" name="TextBox 75">
-            <a:extLst>
-              <a:ext uri="{FF2B5EF4-FFF2-40B4-BE49-F238E27FC236}">
-                <a16:creationId xmlns:a16="http://schemas.microsoft.com/office/drawing/2014/main" id="{9F762DCA-C235-34FF-4E0E-2CDB5C506316}"/>
-              </a:ext>
-            </a:extLst>
-          </p:cNvPr>
-          <p:cNvSpPr txBox="1"/>
-          <p:nvPr/>
-        </p:nvSpPr>
-        <p:spPr>
-          <a:xfrm>
-            <a:off x="7837014" y="3590925"/>
-            <a:ext cx="288862" cy="1569660"/>
-          </a:xfrm>
-          <a:prstGeom prst="rect">
-            <a:avLst/>
-          </a:prstGeom>
-          <a:noFill/>
-        </p:spPr>
-        <p:txBody>
-          <a:bodyPr wrap="none" rtlCol="0">
-            <a:spAutoFit/>
-          </a:bodyPr>
-          <a:lstStyle/>
-          <a:p>
-            <a:r>
-              <a:rPr lang="en-US" sz="3200" dirty="0"/>
-              <a:t>.</a:t>
-            </a:r>
-          </a:p>
-          <a:p>
-            <a:r>
-              <a:rPr lang="en-US" sz="3200" dirty="0"/>
-              <a:t>.</a:t>
-            </a:r>
-          </a:p>
-          <a:p>
-            <a:r>
-              <a:rPr lang="en-US" sz="3200" dirty="0"/>
-              <a:t>.</a:t>
-            </a:r>
-          </a:p>
-        </p:txBody>
-      </p:sp>
-      <p:sp>
-        <p:nvSpPr>
-          <p:cNvPr id="79" name="TextBox 78">
-            <a:extLst>
-              <a:ext uri="{FF2B5EF4-FFF2-40B4-BE49-F238E27FC236}">
-                <a16:creationId xmlns:a16="http://schemas.microsoft.com/office/drawing/2014/main" id="{B496E3A8-B411-4E2E-495A-8F723D850899}"/>
-              </a:ext>
-            </a:extLst>
-          </p:cNvPr>
-          <p:cNvSpPr txBox="1"/>
-          <p:nvPr/>
-        </p:nvSpPr>
-        <p:spPr>
-          <a:xfrm>
-            <a:off x="7344792" y="53342"/>
-            <a:ext cx="1220975" cy="369332"/>
-          </a:xfrm>
-          <a:prstGeom prst="rect">
-            <a:avLst/>
-          </a:prstGeom>
-          <a:noFill/>
-        </p:spPr>
-        <p:txBody>
-          <a:bodyPr wrap="none" rtlCol="0">
-            <a:spAutoFit/>
-          </a:bodyPr>
-          <a:lstStyle/>
-          <a:p>
-            <a:r>
-              <a:rPr lang="en-US" dirty="0"/>
-              <a:t>Java Spring</a:t>
-            </a:r>
-          </a:p>
-        </p:txBody>
-      </p:sp>
-      <p:sp>
-        <p:nvSpPr>
-          <p:cNvPr id="30" name="Rectangle: Rounded Corners 29">
-            <a:extLst>
-              <a:ext uri="{FF2B5EF4-FFF2-40B4-BE49-F238E27FC236}">
-                <a16:creationId xmlns:a16="http://schemas.microsoft.com/office/drawing/2014/main" id="{B0D9B4F1-3A67-FE7F-D534-F21948B67CAB}"/>
-              </a:ext>
-            </a:extLst>
-          </p:cNvPr>
-          <p:cNvSpPr/>
-          <p:nvPr/>
-        </p:nvSpPr>
-        <p:spPr>
-          <a:xfrm>
-            <a:off x="6756400" y="427345"/>
-            <a:ext cx="2397760" cy="6339215"/>
-          </a:xfrm>
-          <a:prstGeom prst="roundRect">
-            <a:avLst/>
-          </a:prstGeom>
-          <a:noFill/>
-        </p:spPr>
-        <p:style>
-          <a:lnRef idx="2">
-            <a:schemeClr val="accent1">
-              <a:shade val="50000"/>
-            </a:schemeClr>
-          </a:lnRef>
-          <a:fillRef idx="1">
-            <a:schemeClr val="accent1"/>
-          </a:fillRef>
-          <a:effectRef idx="0">
-            <a:schemeClr val="accent1"/>
-          </a:effectRef>
-          <a:fontRef idx="minor">
-            <a:schemeClr val="lt1"/>
-          </a:fontRef>
-        </p:style>
-        <p:txBody>
-          <a:bodyPr rtlCol="0" anchor="ctr"/>
-          <a:lstStyle/>
-          <a:p>
-            <a:pPr algn="ctr"/>
-            <a:endParaRPr lang="en-US"/>
-          </a:p>
-        </p:txBody>
-      </p:sp>
-      <p:cxnSp>
-        <p:nvCxnSpPr>
-          <p:cNvPr id="61" name="Straight Connector 60">
-            <a:extLst>
-              <a:ext uri="{FF2B5EF4-FFF2-40B4-BE49-F238E27FC236}">
-                <a16:creationId xmlns:a16="http://schemas.microsoft.com/office/drawing/2014/main" id="{71B73AE6-6C37-C4F9-52DD-AADC79DA4613}"/>
-              </a:ext>
-            </a:extLst>
-          </p:cNvPr>
-          <p:cNvCxnSpPr>
-            <a:cxnSpLocks/>
-            <a:stCxn id="24" idx="1"/>
-          </p:cNvCxnSpPr>
-          <p:nvPr/>
-        </p:nvCxnSpPr>
-        <p:spPr>
-          <a:xfrm flipH="1" flipV="1">
-            <a:off x="9154160" y="4958144"/>
-            <a:ext cx="902205" cy="4381"/>
-          </a:xfrm>
-          <a:prstGeom prst="line">
-            <a:avLst/>
-          </a:prstGeom>
-          <a:ln w="31750">
-            <a:solidFill>
-              <a:schemeClr val="tx1"/>
-            </a:solidFill>
-          </a:ln>
-        </p:spPr>
-        <p:style>
-          <a:lnRef idx="1">
-            <a:schemeClr val="accent1"/>
-          </a:lnRef>
-          <a:fillRef idx="0">
-            <a:schemeClr val="accent1"/>
-          </a:fillRef>
-          <a:effectRef idx="0">
-            <a:schemeClr val="accent1"/>
-          </a:effectRef>
-          <a:fontRef idx="minor">
-            <a:schemeClr val="tx1"/>
-          </a:fontRef>
-        </p:style>
-      </p:cxnSp>
-      <p:sp>
-        <p:nvSpPr>
-          <p:cNvPr id="68" name="Rectangle: Rounded Corners 67">
-            <a:extLst>
-              <a:ext uri="{FF2B5EF4-FFF2-40B4-BE49-F238E27FC236}">
-                <a16:creationId xmlns:a16="http://schemas.microsoft.com/office/drawing/2014/main" id="{6FD06DD7-FEFD-6495-E6EA-F715F787B7BD}"/>
-              </a:ext>
-            </a:extLst>
-          </p:cNvPr>
-          <p:cNvSpPr/>
-          <p:nvPr/>
-        </p:nvSpPr>
-        <p:spPr>
-          <a:xfrm>
-            <a:off x="10056365" y="1796233"/>
-            <a:ext cx="1828800" cy="1110343"/>
+            <a:off x="10056365" y="2329970"/>
+            <a:ext cx="1828800" cy="1087715"/>
           </a:xfrm>
           <a:prstGeom prst="roundRect">
             <a:avLst/>
@@ -4229,7 +3855,7 @@
                   <a:schemeClr val="tx1"/>
                 </a:solidFill>
               </a:rPr>
-              <a:t>Image Store</a:t>
+              <a:t>Database</a:t>
             </a:r>
           </a:p>
         </p:txBody>
@@ -4246,13 +3872,14 @@
           <p:cNvCxnSpPr>
             <a:cxnSpLocks/>
             <a:stCxn id="68" idx="1"/>
+            <a:endCxn id="19" idx="3"/>
           </p:cNvCxnSpPr>
           <p:nvPr/>
         </p:nvCxnSpPr>
         <p:spPr>
           <a:xfrm flipH="1">
-            <a:off x="9154160" y="2351405"/>
-            <a:ext cx="902205" cy="0"/>
+            <a:off x="8859398" y="2873828"/>
+            <a:ext cx="1196967" cy="0"/>
           </a:xfrm>
           <a:prstGeom prst="line">
             <a:avLst/>
@@ -4339,139 +3966,6 @@
       </p:sp>
       <p:cxnSp>
         <p:nvCxnSpPr>
-          <p:cNvPr id="72" name="Straight Connector 71">
-            <a:extLst>
-              <a:ext uri="{FF2B5EF4-FFF2-40B4-BE49-F238E27FC236}">
-                <a16:creationId xmlns:a16="http://schemas.microsoft.com/office/drawing/2014/main" id="{F8CC3657-9F1D-3419-45EE-09A987717297}"/>
-              </a:ext>
-            </a:extLst>
-          </p:cNvPr>
-          <p:cNvCxnSpPr>
-            <a:cxnSpLocks/>
-            <a:stCxn id="14" idx="5"/>
-          </p:cNvCxnSpPr>
-          <p:nvPr/>
-        </p:nvCxnSpPr>
-        <p:spPr>
-          <a:xfrm>
-            <a:off x="3800449" y="2251112"/>
-            <a:ext cx="979002" cy="495222"/>
-          </a:xfrm>
-          <a:prstGeom prst="line">
-            <a:avLst/>
-          </a:prstGeom>
-          <a:ln w="31750">
-            <a:solidFill>
-              <a:schemeClr val="tx1"/>
-            </a:solidFill>
-          </a:ln>
-        </p:spPr>
-        <p:style>
-          <a:lnRef idx="1">
-            <a:schemeClr val="accent1"/>
-          </a:lnRef>
-          <a:fillRef idx="0">
-            <a:schemeClr val="accent1"/>
-          </a:fillRef>
-          <a:effectRef idx="0">
-            <a:schemeClr val="accent1"/>
-          </a:effectRef>
-          <a:fontRef idx="minor">
-            <a:schemeClr val="tx1"/>
-          </a:fontRef>
-        </p:style>
-      </p:cxnSp>
-      <p:cxnSp>
-        <p:nvCxnSpPr>
-          <p:cNvPr id="81" name="Straight Connector 80">
-            <a:extLst>
-              <a:ext uri="{FF2B5EF4-FFF2-40B4-BE49-F238E27FC236}">
-                <a16:creationId xmlns:a16="http://schemas.microsoft.com/office/drawing/2014/main" id="{6276BC49-92ED-2915-E7A4-E9DC8DFF1D9A}"/>
-              </a:ext>
-            </a:extLst>
-          </p:cNvPr>
-          <p:cNvCxnSpPr>
-            <a:cxnSpLocks/>
-            <a:stCxn id="15" idx="6"/>
-            <a:endCxn id="71" idx="1"/>
-          </p:cNvCxnSpPr>
-          <p:nvPr/>
-        </p:nvCxnSpPr>
-        <p:spPr>
-          <a:xfrm flipV="1">
-            <a:off x="3872984" y="3207664"/>
-            <a:ext cx="894982" cy="1"/>
-          </a:xfrm>
-          <a:prstGeom prst="line">
-            <a:avLst/>
-          </a:prstGeom>
-          <a:ln w="31750">
-            <a:solidFill>
-              <a:schemeClr val="tx1"/>
-            </a:solidFill>
-          </a:ln>
-        </p:spPr>
-        <p:style>
-          <a:lnRef idx="1">
-            <a:schemeClr val="accent1"/>
-          </a:lnRef>
-          <a:fillRef idx="0">
-            <a:schemeClr val="accent1"/>
-          </a:fillRef>
-          <a:effectRef idx="0">
-            <a:schemeClr val="accent1"/>
-          </a:effectRef>
-          <a:fontRef idx="minor">
-            <a:schemeClr val="tx1"/>
-          </a:fontRef>
-        </p:style>
-      </p:cxnSp>
-      <p:cxnSp>
-        <p:nvCxnSpPr>
-          <p:cNvPr id="84" name="Straight Connector 83">
-            <a:extLst>
-              <a:ext uri="{FF2B5EF4-FFF2-40B4-BE49-F238E27FC236}">
-                <a16:creationId xmlns:a16="http://schemas.microsoft.com/office/drawing/2014/main" id="{2B8FAE3A-90CC-6E97-04DA-996370D8790B}"/>
-              </a:ext>
-            </a:extLst>
-          </p:cNvPr>
-          <p:cNvCxnSpPr>
-            <a:cxnSpLocks/>
-            <a:stCxn id="13" idx="6"/>
-          </p:cNvCxnSpPr>
-          <p:nvPr/>
-        </p:nvCxnSpPr>
-        <p:spPr>
-          <a:xfrm flipV="1">
-            <a:off x="3872984" y="3668995"/>
-            <a:ext cx="906467" cy="501050"/>
-          </a:xfrm>
-          <a:prstGeom prst="line">
-            <a:avLst/>
-          </a:prstGeom>
-          <a:ln w="31750">
-            <a:solidFill>
-              <a:schemeClr val="tx1"/>
-            </a:solidFill>
-          </a:ln>
-        </p:spPr>
-        <p:style>
-          <a:lnRef idx="1">
-            <a:schemeClr val="accent1"/>
-          </a:lnRef>
-          <a:fillRef idx="0">
-            <a:schemeClr val="accent1"/>
-          </a:fillRef>
-          <a:effectRef idx="0">
-            <a:schemeClr val="accent1"/>
-          </a:effectRef>
-          <a:fontRef idx="minor">
-            <a:schemeClr val="tx1"/>
-          </a:fontRef>
-        </p:style>
-      </p:cxnSp>
-      <p:cxnSp>
-        <p:nvCxnSpPr>
           <p:cNvPr id="95" name="Straight Connector 94">
             <a:extLst>
               <a:ext uri="{FF2B5EF4-FFF2-40B4-BE49-F238E27FC236}">
@@ -4602,6 +4096,402 @@
           </a:fontRef>
         </p:style>
       </p:cxnSp>
+      <p:sp>
+        <p:nvSpPr>
+          <p:cNvPr id="2" name="Rectangle: Rounded Corners 1">
+            <a:extLst>
+              <a:ext uri="{FF2B5EF4-FFF2-40B4-BE49-F238E27FC236}">
+                <a16:creationId xmlns:a16="http://schemas.microsoft.com/office/drawing/2014/main" id="{D178D8F1-EB8C-D729-7BA0-AE12F76718DF}"/>
+              </a:ext>
+            </a:extLst>
+          </p:cNvPr>
+          <p:cNvSpPr/>
+          <p:nvPr/>
+        </p:nvSpPr>
+        <p:spPr>
+          <a:xfrm>
+            <a:off x="377955" y="2809177"/>
+            <a:ext cx="1828800" cy="1110343"/>
+          </a:xfrm>
+          <a:prstGeom prst="roundRect">
+            <a:avLst/>
+          </a:prstGeom>
+          <a:noFill/>
+          <a:ln w="31750">
+            <a:solidFill>
+              <a:schemeClr val="tx1"/>
+            </a:solidFill>
+          </a:ln>
+        </p:spPr>
+        <p:style>
+          <a:lnRef idx="2">
+            <a:schemeClr val="accent1">
+              <a:shade val="50000"/>
+            </a:schemeClr>
+          </a:lnRef>
+          <a:fillRef idx="1">
+            <a:schemeClr val="accent1"/>
+          </a:fillRef>
+          <a:effectRef idx="0">
+            <a:schemeClr val="accent1"/>
+          </a:effectRef>
+          <a:fontRef idx="minor">
+            <a:schemeClr val="lt1"/>
+          </a:fontRef>
+        </p:style>
+        <p:txBody>
+          <a:bodyPr rtlCol="0" anchor="ctr"/>
+          <a:lstStyle/>
+          <a:p>
+            <a:pPr algn="ctr"/>
+            <a:r>
+              <a:rPr lang="en-US" dirty="0">
+                <a:solidFill>
+                  <a:schemeClr val="tx1"/>
+                </a:solidFill>
+              </a:rPr>
+              <a:t>Client</a:t>
+            </a:r>
+          </a:p>
+        </p:txBody>
+      </p:sp>
+      <p:sp>
+        <p:nvSpPr>
+          <p:cNvPr id="3" name="Rectangle: Rounded Corners 2">
+            <a:extLst>
+              <a:ext uri="{FF2B5EF4-FFF2-40B4-BE49-F238E27FC236}">
+                <a16:creationId xmlns:a16="http://schemas.microsoft.com/office/drawing/2014/main" id="{C4621AA0-71CB-96C0-738D-516067E602CC}"/>
+              </a:ext>
+            </a:extLst>
+          </p:cNvPr>
+          <p:cNvSpPr/>
+          <p:nvPr/>
+        </p:nvSpPr>
+        <p:spPr>
+          <a:xfrm>
+            <a:off x="377955" y="4539699"/>
+            <a:ext cx="1828800" cy="1110343"/>
+          </a:xfrm>
+          <a:prstGeom prst="roundRect">
+            <a:avLst/>
+          </a:prstGeom>
+          <a:noFill/>
+          <a:ln w="31750">
+            <a:solidFill>
+              <a:schemeClr val="tx1"/>
+            </a:solidFill>
+          </a:ln>
+        </p:spPr>
+        <p:style>
+          <a:lnRef idx="2">
+            <a:schemeClr val="accent1">
+              <a:shade val="50000"/>
+            </a:schemeClr>
+          </a:lnRef>
+          <a:fillRef idx="1">
+            <a:schemeClr val="accent1"/>
+          </a:fillRef>
+          <a:effectRef idx="0">
+            <a:schemeClr val="accent1"/>
+          </a:effectRef>
+          <a:fontRef idx="minor">
+            <a:schemeClr val="lt1"/>
+          </a:fontRef>
+        </p:style>
+        <p:txBody>
+          <a:bodyPr rtlCol="0" anchor="ctr"/>
+          <a:lstStyle/>
+          <a:p>
+            <a:pPr algn="ctr"/>
+            <a:r>
+              <a:rPr lang="en-US" dirty="0">
+                <a:solidFill>
+                  <a:schemeClr val="tx1"/>
+                </a:solidFill>
+              </a:rPr>
+              <a:t>Client</a:t>
+            </a:r>
+          </a:p>
+        </p:txBody>
+      </p:sp>
+      <p:cxnSp>
+        <p:nvCxnSpPr>
+          <p:cNvPr id="11" name="Straight Connector 10">
+            <a:extLst>
+              <a:ext uri="{FF2B5EF4-FFF2-40B4-BE49-F238E27FC236}">
+                <a16:creationId xmlns:a16="http://schemas.microsoft.com/office/drawing/2014/main" id="{34925DCE-0005-E5AE-B1A3-75E5C99CA10F}"/>
+              </a:ext>
+            </a:extLst>
+          </p:cNvPr>
+          <p:cNvCxnSpPr>
+            <a:cxnSpLocks/>
+            <a:stCxn id="4" idx="3"/>
+          </p:cNvCxnSpPr>
+          <p:nvPr/>
+        </p:nvCxnSpPr>
+        <p:spPr>
+          <a:xfrm>
+            <a:off x="2206755" y="1370700"/>
+            <a:ext cx="2561211" cy="1407159"/>
+          </a:xfrm>
+          <a:prstGeom prst="line">
+            <a:avLst/>
+          </a:prstGeom>
+          <a:ln w="31750">
+            <a:solidFill>
+              <a:schemeClr val="tx1"/>
+            </a:solidFill>
+            <a:headEnd type="triangle"/>
+            <a:tailEnd type="triangle"/>
+          </a:ln>
+        </p:spPr>
+        <p:style>
+          <a:lnRef idx="1">
+            <a:schemeClr val="accent1"/>
+          </a:lnRef>
+          <a:fillRef idx="0">
+            <a:schemeClr val="accent1"/>
+          </a:fillRef>
+          <a:effectRef idx="0">
+            <a:schemeClr val="accent1"/>
+          </a:effectRef>
+          <a:fontRef idx="minor">
+            <a:schemeClr val="tx1"/>
+          </a:fontRef>
+        </p:style>
+      </p:cxnSp>
+      <p:cxnSp>
+        <p:nvCxnSpPr>
+          <p:cNvPr id="18" name="Straight Connector 17">
+            <a:extLst>
+              <a:ext uri="{FF2B5EF4-FFF2-40B4-BE49-F238E27FC236}">
+                <a16:creationId xmlns:a16="http://schemas.microsoft.com/office/drawing/2014/main" id="{F4241B73-52E5-0017-81C2-CD5F49AFBFE2}"/>
+              </a:ext>
+            </a:extLst>
+          </p:cNvPr>
+          <p:cNvCxnSpPr>
+            <a:cxnSpLocks/>
+            <a:stCxn id="2" idx="3"/>
+            <a:endCxn id="71" idx="1"/>
+          </p:cNvCxnSpPr>
+          <p:nvPr/>
+        </p:nvCxnSpPr>
+        <p:spPr>
+          <a:xfrm flipV="1">
+            <a:off x="2206755" y="3207664"/>
+            <a:ext cx="2561211" cy="156685"/>
+          </a:xfrm>
+          <a:prstGeom prst="line">
+            <a:avLst/>
+          </a:prstGeom>
+          <a:ln w="31750">
+            <a:solidFill>
+              <a:schemeClr val="tx1"/>
+            </a:solidFill>
+            <a:headEnd type="triangle"/>
+            <a:tailEnd type="triangle"/>
+          </a:ln>
+        </p:spPr>
+        <p:style>
+          <a:lnRef idx="1">
+            <a:schemeClr val="accent1"/>
+          </a:lnRef>
+          <a:fillRef idx="0">
+            <a:schemeClr val="accent1"/>
+          </a:fillRef>
+          <a:effectRef idx="0">
+            <a:schemeClr val="accent1"/>
+          </a:effectRef>
+          <a:fontRef idx="minor">
+            <a:schemeClr val="tx1"/>
+          </a:fontRef>
+        </p:style>
+      </p:cxnSp>
+      <p:cxnSp>
+        <p:nvCxnSpPr>
+          <p:cNvPr id="23" name="Straight Connector 22">
+            <a:extLst>
+              <a:ext uri="{FF2B5EF4-FFF2-40B4-BE49-F238E27FC236}">
+                <a16:creationId xmlns:a16="http://schemas.microsoft.com/office/drawing/2014/main" id="{DDC255F9-B351-720D-19C5-1D3147FB0BB5}"/>
+              </a:ext>
+            </a:extLst>
+          </p:cNvPr>
+          <p:cNvCxnSpPr>
+            <a:cxnSpLocks/>
+            <a:stCxn id="3" idx="3"/>
+          </p:cNvCxnSpPr>
+          <p:nvPr/>
+        </p:nvCxnSpPr>
+        <p:spPr>
+          <a:xfrm flipV="1">
+            <a:off x="2206755" y="3919520"/>
+            <a:ext cx="2561211" cy="1175351"/>
+          </a:xfrm>
+          <a:prstGeom prst="line">
+            <a:avLst/>
+          </a:prstGeom>
+          <a:ln w="31750">
+            <a:solidFill>
+              <a:schemeClr val="tx1"/>
+            </a:solidFill>
+            <a:headEnd type="triangle"/>
+            <a:tailEnd type="triangle"/>
+          </a:ln>
+        </p:spPr>
+        <p:style>
+          <a:lnRef idx="1">
+            <a:schemeClr val="accent1"/>
+          </a:lnRef>
+          <a:fillRef idx="0">
+            <a:schemeClr val="accent1"/>
+          </a:fillRef>
+          <a:effectRef idx="0">
+            <a:schemeClr val="accent1"/>
+          </a:effectRef>
+          <a:fontRef idx="minor">
+            <a:schemeClr val="tx1"/>
+          </a:fontRef>
+        </p:style>
+      </p:cxnSp>
+      <p:sp>
+        <p:nvSpPr>
+          <p:cNvPr id="36" name="Rectangle: Rounded Corners 35">
+            <a:extLst>
+              <a:ext uri="{FF2B5EF4-FFF2-40B4-BE49-F238E27FC236}">
+                <a16:creationId xmlns:a16="http://schemas.microsoft.com/office/drawing/2014/main" id="{56E08416-6F88-2F3F-CA7F-B1839B2FF591}"/>
+              </a:ext>
+            </a:extLst>
+          </p:cNvPr>
+          <p:cNvSpPr/>
+          <p:nvPr/>
+        </p:nvSpPr>
+        <p:spPr>
+          <a:xfrm>
+            <a:off x="10056365" y="632378"/>
+            <a:ext cx="1828800" cy="1110343"/>
+          </a:xfrm>
+          <a:prstGeom prst="roundRect">
+            <a:avLst/>
+          </a:prstGeom>
+          <a:noFill/>
+          <a:ln w="31750">
+            <a:solidFill>
+              <a:schemeClr val="tx1"/>
+            </a:solidFill>
+          </a:ln>
+        </p:spPr>
+        <p:style>
+          <a:lnRef idx="2">
+            <a:schemeClr val="accent1">
+              <a:shade val="50000"/>
+            </a:schemeClr>
+          </a:lnRef>
+          <a:fillRef idx="1">
+            <a:schemeClr val="accent1"/>
+          </a:fillRef>
+          <a:effectRef idx="0">
+            <a:schemeClr val="accent1"/>
+          </a:effectRef>
+          <a:fontRef idx="minor">
+            <a:schemeClr val="lt1"/>
+          </a:fontRef>
+        </p:style>
+        <p:txBody>
+          <a:bodyPr rtlCol="0" anchor="ctr"/>
+          <a:lstStyle/>
+          <a:p>
+            <a:pPr algn="ctr"/>
+            <a:r>
+              <a:rPr lang="en-US" dirty="0">
+                <a:solidFill>
+                  <a:schemeClr val="tx1"/>
+                </a:solidFill>
+              </a:rPr>
+              <a:t>Database</a:t>
+            </a:r>
+          </a:p>
+        </p:txBody>
+      </p:sp>
+      <p:cxnSp>
+        <p:nvCxnSpPr>
+          <p:cNvPr id="37" name="Straight Connector 36">
+            <a:extLst>
+              <a:ext uri="{FF2B5EF4-FFF2-40B4-BE49-F238E27FC236}">
+                <a16:creationId xmlns:a16="http://schemas.microsoft.com/office/drawing/2014/main" id="{44E57271-A411-E708-952D-FA05462093BF}"/>
+              </a:ext>
+            </a:extLst>
+          </p:cNvPr>
+          <p:cNvCxnSpPr>
+            <a:cxnSpLocks/>
+            <a:stCxn id="36" idx="1"/>
+            <a:endCxn id="17" idx="3"/>
+          </p:cNvCxnSpPr>
+          <p:nvPr/>
+        </p:nvCxnSpPr>
+        <p:spPr>
+          <a:xfrm flipH="1">
+            <a:off x="8859398" y="1187550"/>
+            <a:ext cx="1196967" cy="354"/>
+          </a:xfrm>
+          <a:prstGeom prst="line">
+            <a:avLst/>
+          </a:prstGeom>
+          <a:ln w="31750">
+            <a:solidFill>
+              <a:schemeClr val="tx1"/>
+            </a:solidFill>
+          </a:ln>
+        </p:spPr>
+        <p:style>
+          <a:lnRef idx="1">
+            <a:schemeClr val="accent1"/>
+          </a:lnRef>
+          <a:fillRef idx="0">
+            <a:schemeClr val="accent1"/>
+          </a:fillRef>
+          <a:effectRef idx="0">
+            <a:schemeClr val="accent1"/>
+          </a:effectRef>
+          <a:fontRef idx="minor">
+            <a:schemeClr val="tx1"/>
+          </a:fontRef>
+        </p:style>
+      </p:cxnSp>
+      <p:sp>
+        <p:nvSpPr>
+          <p:cNvPr id="43" name="TextBox 42">
+            <a:extLst>
+              <a:ext uri="{FF2B5EF4-FFF2-40B4-BE49-F238E27FC236}">
+                <a16:creationId xmlns:a16="http://schemas.microsoft.com/office/drawing/2014/main" id="{58F09106-190B-E400-D748-59FA241163DA}"/>
+              </a:ext>
+            </a:extLst>
+          </p:cNvPr>
+          <p:cNvSpPr txBox="1"/>
+          <p:nvPr/>
+        </p:nvSpPr>
+        <p:spPr>
+          <a:xfrm>
+            <a:off x="915289" y="320773"/>
+            <a:ext cx="754131" cy="369332"/>
+          </a:xfrm>
+          <a:prstGeom prst="rect">
+            <a:avLst/>
+          </a:prstGeom>
+          <a:noFill/>
+        </p:spPr>
+        <p:txBody>
+          <a:bodyPr wrap="square">
+            <a:spAutoFit/>
+          </a:bodyPr>
+          <a:lstStyle/>
+          <a:p>
+            <a:r>
+              <a:rPr lang="en-US" dirty="0"/>
+              <a:t>React</a:t>
+            </a:r>
+          </a:p>
+        </p:txBody>
+      </p:sp>
     </p:spTree>
     <p:extLst>
       <p:ext uri="{BB962C8B-B14F-4D97-AF65-F5344CB8AC3E}">
@@ -4646,8 +4536,8 @@
         </p:nvSpPr>
         <p:spPr>
           <a:xfrm>
-            <a:off x="449074" y="1378856"/>
-            <a:ext cx="983485" cy="1013823"/>
+            <a:off x="829916" y="1378856"/>
+            <a:ext cx="1615107" cy="1013823"/>
           </a:xfrm>
           <a:prstGeom prst="roundRect">
             <a:avLst/>
@@ -4686,57 +4576,9 @@
                   <a:schemeClr val="tx1"/>
                 </a:solidFill>
               </a:rPr>
-              <a:t>Seller</a:t>
-            </a:r>
-          </a:p>
-        </p:txBody>
-      </p:sp>
-      <p:sp>
-        <p:nvSpPr>
-          <p:cNvPr id="8" name="Rectangle: Rounded Corners 7">
-            <a:extLst>
-              <a:ext uri="{FF2B5EF4-FFF2-40B4-BE49-F238E27FC236}">
-                <a16:creationId xmlns:a16="http://schemas.microsoft.com/office/drawing/2014/main" id="{39052023-9149-E9C9-9A48-014745A3A740}"/>
-              </a:ext>
-            </a:extLst>
-          </p:cNvPr>
-          <p:cNvSpPr/>
-          <p:nvPr/>
-        </p:nvSpPr>
-        <p:spPr>
-          <a:xfrm>
-            <a:off x="2501395" y="1378855"/>
-            <a:ext cx="1339085" cy="1013824"/>
-          </a:xfrm>
-          <a:prstGeom prst="roundRect">
-            <a:avLst/>
-          </a:prstGeom>
-          <a:noFill/>
-          <a:ln w="31750">
-            <a:solidFill>
-              <a:schemeClr val="tx1"/>
-            </a:solidFill>
-          </a:ln>
-        </p:spPr>
-        <p:style>
-          <a:lnRef idx="2">
-            <a:schemeClr val="accent1">
-              <a:shade val="50000"/>
-            </a:schemeClr>
-          </a:lnRef>
-          <a:fillRef idx="1">
-            <a:schemeClr val="accent1"/>
-          </a:fillRef>
-          <a:effectRef idx="0">
-            <a:schemeClr val="accent1"/>
-          </a:effectRef>
-          <a:fontRef idx="minor">
-            <a:schemeClr val="lt1"/>
-          </a:fontRef>
-        </p:style>
-        <p:txBody>
-          <a:bodyPr rtlCol="0" anchor="ctr"/>
-          <a:lstStyle/>
+              <a:t>Buyer</a:t>
+            </a:r>
+          </a:p>
           <a:p>
             <a:pPr algn="ctr"/>
             <a:r>
@@ -4745,7 +4587,7 @@
                   <a:schemeClr val="tx1"/>
                 </a:solidFill>
               </a:rPr>
-              <a:t>SellService</a:t>
+              <a:t>CartScreen</a:t>
             </a:r>
             <a:endParaRPr lang="en-US" dirty="0">
               <a:solidFill>
@@ -4767,14 +4609,13 @@
           <p:cNvCxnSpPr>
             <a:cxnSpLocks/>
             <a:stCxn id="5" idx="3"/>
-            <a:endCxn id="8" idx="1"/>
           </p:cNvCxnSpPr>
           <p:nvPr/>
         </p:nvCxnSpPr>
         <p:spPr>
           <a:xfrm flipV="1">
-            <a:off x="1432559" y="1885767"/>
-            <a:ext cx="1068836" cy="1"/>
+            <a:off x="2445023" y="1885767"/>
+            <a:ext cx="836593" cy="1"/>
           </a:xfrm>
           <a:prstGeom prst="line">
             <a:avLst/>
@@ -4816,8 +4657,8 @@
         </p:nvSpPr>
         <p:spPr>
           <a:xfrm>
-            <a:off x="449074" y="4382951"/>
-            <a:ext cx="983485" cy="1013823"/>
+            <a:off x="829917" y="4382951"/>
+            <a:ext cx="1615108" cy="1013823"/>
           </a:xfrm>
           <a:prstGeom prst="roundRect">
             <a:avLst/>
@@ -4856,8 +4697,21 @@
                   <a:schemeClr val="tx1"/>
                 </a:solidFill>
               </a:rPr>
-              <a:t>Buyer</a:t>
-            </a:r>
+              <a:t>Buyer </a:t>
+            </a:r>
+            <a:r>
+              <a:rPr lang="en-US" dirty="0" err="1">
+                <a:solidFill>
+                  <a:schemeClr val="tx1"/>
+                </a:solidFill>
+              </a:rPr>
+              <a:t>HomeScreen</a:t>
+            </a:r>
+            <a:endParaRPr lang="en-US" dirty="0">
+              <a:solidFill>
+                <a:schemeClr val="tx1"/>
+              </a:solidFill>
+            </a:endParaRPr>
           </a:p>
         </p:txBody>
       </p:sp>
@@ -4875,7 +4729,7 @@
         </p:nvSpPr>
         <p:spPr>
           <a:xfrm>
-            <a:off x="2501395" y="4382950"/>
+            <a:off x="3281616" y="4382950"/>
             <a:ext cx="1339085" cy="1013824"/>
           </a:xfrm>
           <a:prstGeom prst="roundRect">
@@ -4915,7 +4769,7 @@
                   <a:schemeClr val="tx1"/>
                 </a:solidFill>
               </a:rPr>
-              <a:t>BuyService</a:t>
+              <a:t>CartReducer</a:t>
             </a:r>
             <a:endParaRPr lang="en-US" dirty="0">
               <a:solidFill>
@@ -4925,53 +4779,6 @@
           </a:p>
         </p:txBody>
       </p:sp>
-      <p:cxnSp>
-        <p:nvCxnSpPr>
-          <p:cNvPr id="27" name="Straight Connector 26">
-            <a:extLst>
-              <a:ext uri="{FF2B5EF4-FFF2-40B4-BE49-F238E27FC236}">
-                <a16:creationId xmlns:a16="http://schemas.microsoft.com/office/drawing/2014/main" id="{4E8BEF72-618F-F20D-F3F3-5C59D6D8967F}"/>
-              </a:ext>
-            </a:extLst>
-          </p:cNvPr>
-          <p:cNvCxnSpPr>
-            <a:cxnSpLocks/>
-            <a:stCxn id="25" idx="3"/>
-            <a:endCxn id="26" idx="1"/>
-          </p:cNvCxnSpPr>
-          <p:nvPr/>
-        </p:nvCxnSpPr>
-        <p:spPr>
-          <a:xfrm flipV="1">
-            <a:off x="1432559" y="4889862"/>
-            <a:ext cx="1068836" cy="1"/>
-          </a:xfrm>
-          <a:prstGeom prst="line">
-            <a:avLst/>
-          </a:prstGeom>
-          <a:ln w="31750">
-            <a:solidFill>
-              <a:schemeClr val="tx1"/>
-            </a:solidFill>
-            <a:headEnd type="triangle" w="med" len="med"/>
-            <a:tailEnd type="triangle" w="med" len="med"/>
-          </a:ln>
-        </p:spPr>
-        <p:style>
-          <a:lnRef idx="1">
-            <a:schemeClr val="accent1"/>
-          </a:lnRef>
-          <a:fillRef idx="0">
-            <a:schemeClr val="accent1"/>
-          </a:fillRef>
-          <a:effectRef idx="0">
-            <a:schemeClr val="accent1"/>
-          </a:effectRef>
-          <a:fontRef idx="minor">
-            <a:schemeClr val="tx1"/>
-          </a:fontRef>
-        </p:style>
-      </p:cxnSp>
       <p:sp>
         <p:nvSpPr>
           <p:cNvPr id="28" name="Rectangle: Rounded Corners 27">
@@ -4986,7 +4793,7 @@
         </p:nvSpPr>
         <p:spPr>
           <a:xfrm>
-            <a:off x="4939795" y="1378854"/>
+            <a:off x="10318426" y="1178833"/>
             <a:ext cx="1339085" cy="4017919"/>
           </a:xfrm>
           <a:prstGeom prst="roundRect">
@@ -5033,10 +4840,10 @@
       </p:sp>
       <p:sp>
         <p:nvSpPr>
-          <p:cNvPr id="29" name="Rectangle: Rounded Corners 28">
-            <a:extLst>
-              <a:ext uri="{FF2B5EF4-FFF2-40B4-BE49-F238E27FC236}">
-                <a16:creationId xmlns:a16="http://schemas.microsoft.com/office/drawing/2014/main" id="{1C0B3B43-7803-600C-FB4F-566B7B072C07}"/>
+          <p:cNvPr id="3" name="Rectangle: Rounded Corners 2">
+            <a:extLst>
+              <a:ext uri="{FF2B5EF4-FFF2-40B4-BE49-F238E27FC236}">
+                <a16:creationId xmlns:a16="http://schemas.microsoft.com/office/drawing/2014/main" id="{5797F81B-7F60-C61B-1216-B8CC8F67F788}"/>
               </a:ext>
             </a:extLst>
           </p:cNvPr>
@@ -5045,7 +4852,7 @@
         </p:nvSpPr>
         <p:spPr>
           <a:xfrm>
-            <a:off x="7185155" y="1375948"/>
+            <a:off x="5868440" y="2680881"/>
             <a:ext cx="1339085" cy="1013824"/>
           </a:xfrm>
           <a:prstGeom prst="roundRect">
@@ -5085,7 +4892,7 @@
                   <a:schemeClr val="tx1"/>
                 </a:solidFill>
               </a:rPr>
-              <a:t>ServerA</a:t>
+              <a:t>CartService</a:t>
             </a:r>
             <a:endParaRPr lang="en-US" dirty="0">
               <a:solidFill>
@@ -5095,213 +4902,69 @@
           </a:p>
         </p:txBody>
       </p:sp>
-      <p:sp>
-        <p:nvSpPr>
-          <p:cNvPr id="30" name="Rectangle: Rounded Corners 29">
-            <a:extLst>
-              <a:ext uri="{FF2B5EF4-FFF2-40B4-BE49-F238E27FC236}">
-                <a16:creationId xmlns:a16="http://schemas.microsoft.com/office/drawing/2014/main" id="{AF9E0A89-470B-631A-6DA9-26DFB3B53F6F}"/>
-              </a:ext>
-            </a:extLst>
-          </p:cNvPr>
-          <p:cNvSpPr/>
+      <p:cxnSp>
+        <p:nvCxnSpPr>
+          <p:cNvPr id="6" name="Straight Connector 5">
+            <a:extLst>
+              <a:ext uri="{FF2B5EF4-FFF2-40B4-BE49-F238E27FC236}">
+                <a16:creationId xmlns:a16="http://schemas.microsoft.com/office/drawing/2014/main" id="{37A56676-FF7E-4828-F260-2AD587B8518A}"/>
+              </a:ext>
+            </a:extLst>
+          </p:cNvPr>
+          <p:cNvCxnSpPr>
+            <a:cxnSpLocks/>
+          </p:cNvCxnSpPr>
           <p:nvPr/>
-        </p:nvSpPr>
+        </p:nvCxnSpPr>
         <p:spPr>
           <a:xfrm>
-            <a:off x="7185154" y="4359724"/>
-            <a:ext cx="1339085" cy="1013824"/>
-          </a:xfrm>
-          <a:prstGeom prst="roundRect">
+            <a:off x="4620701" y="1885767"/>
+            <a:ext cx="1247739" cy="996581"/>
+          </a:xfrm>
+          <a:prstGeom prst="line">
             <a:avLst/>
           </a:prstGeom>
-          <a:noFill/>
           <a:ln w="31750">
             <a:solidFill>
               <a:schemeClr val="tx1"/>
             </a:solidFill>
+            <a:headEnd type="none" w="med" len="med"/>
+            <a:tailEnd type="triangle" w="med" len="med"/>
           </a:ln>
         </p:spPr>
         <p:style>
-          <a:lnRef idx="2">
-            <a:schemeClr val="accent1">
-              <a:shade val="50000"/>
-            </a:schemeClr>
+          <a:lnRef idx="1">
+            <a:schemeClr val="accent1"/>
           </a:lnRef>
-          <a:fillRef idx="1">
+          <a:fillRef idx="0">
             <a:schemeClr val="accent1"/>
           </a:fillRef>
           <a:effectRef idx="0">
             <a:schemeClr val="accent1"/>
           </a:effectRef>
           <a:fontRef idx="minor">
-            <a:schemeClr val="lt1"/>
+            <a:schemeClr val="tx1"/>
           </a:fontRef>
         </p:style>
-        <p:txBody>
-          <a:bodyPr rtlCol="0" anchor="ctr"/>
-          <a:lstStyle/>
-          <a:p>
-            <a:pPr algn="ctr"/>
-            <a:r>
-              <a:rPr lang="en-US" dirty="0" err="1">
-                <a:solidFill>
-                  <a:schemeClr val="tx1"/>
-                </a:solidFill>
-              </a:rPr>
-              <a:t>ServerB</a:t>
-            </a:r>
-            <a:endParaRPr lang="en-US" dirty="0">
-              <a:solidFill>
-                <a:schemeClr val="tx1"/>
-              </a:solidFill>
-            </a:endParaRPr>
-          </a:p>
-        </p:txBody>
-      </p:sp>
-      <p:sp>
-        <p:nvSpPr>
-          <p:cNvPr id="31" name="Rectangle: Rounded Corners 30">
-            <a:extLst>
-              <a:ext uri="{FF2B5EF4-FFF2-40B4-BE49-F238E27FC236}">
-                <a16:creationId xmlns:a16="http://schemas.microsoft.com/office/drawing/2014/main" id="{7CB6E2A9-B427-63F9-E449-AE74D374ADC1}"/>
-              </a:ext>
-            </a:extLst>
-          </p:cNvPr>
-          <p:cNvSpPr/>
-          <p:nvPr/>
-        </p:nvSpPr>
-        <p:spPr>
-          <a:xfrm>
-            <a:off x="9889751" y="1885767"/>
-            <a:ext cx="1438649" cy="1013824"/>
-          </a:xfrm>
-          <a:prstGeom prst="roundRect">
-            <a:avLst/>
-          </a:prstGeom>
-          <a:noFill/>
-          <a:ln w="31750">
-            <a:solidFill>
-              <a:schemeClr val="tx1"/>
-            </a:solidFill>
-          </a:ln>
-        </p:spPr>
-        <p:style>
-          <a:lnRef idx="2">
-            <a:schemeClr val="accent1">
-              <a:shade val="50000"/>
-            </a:schemeClr>
-          </a:lnRef>
-          <a:fillRef idx="1">
-            <a:schemeClr val="accent1"/>
-          </a:fillRef>
-          <a:effectRef idx="0">
-            <a:schemeClr val="accent1"/>
-          </a:effectRef>
-          <a:fontRef idx="minor">
-            <a:schemeClr val="lt1"/>
-          </a:fontRef>
-        </p:style>
-        <p:txBody>
-          <a:bodyPr rtlCol="0" anchor="ctr"/>
-          <a:lstStyle/>
-          <a:p>
-            <a:pPr algn="ctr"/>
-            <a:r>
-              <a:rPr lang="en-US" dirty="0" err="1">
-                <a:solidFill>
-                  <a:schemeClr val="tx1"/>
-                </a:solidFill>
-              </a:rPr>
-              <a:t>ImageStore</a:t>
-            </a:r>
-            <a:endParaRPr lang="en-US" dirty="0">
-              <a:solidFill>
-                <a:schemeClr val="tx1"/>
-              </a:solidFill>
-            </a:endParaRPr>
-          </a:p>
-        </p:txBody>
-      </p:sp>
-      <p:sp>
-        <p:nvSpPr>
-          <p:cNvPr id="32" name="Rectangle: Rounded Corners 31">
-            <a:extLst>
-              <a:ext uri="{FF2B5EF4-FFF2-40B4-BE49-F238E27FC236}">
-                <a16:creationId xmlns:a16="http://schemas.microsoft.com/office/drawing/2014/main" id="{F62D7848-8875-C6A2-3853-DE09E5DAA98C}"/>
-              </a:ext>
-            </a:extLst>
-          </p:cNvPr>
-          <p:cNvSpPr/>
-          <p:nvPr/>
-        </p:nvSpPr>
-        <p:spPr>
-          <a:xfrm>
-            <a:off x="9889751" y="3189511"/>
-            <a:ext cx="1339085" cy="1013824"/>
-          </a:xfrm>
-          <a:prstGeom prst="roundRect">
-            <a:avLst/>
-          </a:prstGeom>
-          <a:noFill/>
-          <a:ln w="31750">
-            <a:solidFill>
-              <a:schemeClr val="tx1"/>
-            </a:solidFill>
-          </a:ln>
-        </p:spPr>
-        <p:style>
-          <a:lnRef idx="2">
-            <a:schemeClr val="accent1">
-              <a:shade val="50000"/>
-            </a:schemeClr>
-          </a:lnRef>
-          <a:fillRef idx="1">
-            <a:schemeClr val="accent1"/>
-          </a:fillRef>
-          <a:effectRef idx="0">
-            <a:schemeClr val="accent1"/>
-          </a:effectRef>
-          <a:fontRef idx="minor">
-            <a:schemeClr val="lt1"/>
-          </a:fontRef>
-        </p:style>
-        <p:txBody>
-          <a:bodyPr rtlCol="0" anchor="ctr"/>
-          <a:lstStyle/>
-          <a:p>
-            <a:pPr algn="ctr"/>
-            <a:r>
-              <a:rPr lang="en-US" dirty="0">
-                <a:solidFill>
-                  <a:schemeClr val="tx1"/>
-                </a:solidFill>
-              </a:rPr>
-              <a:t>Database</a:t>
-            </a:r>
-          </a:p>
-        </p:txBody>
-      </p:sp>
+      </p:cxnSp>
       <p:cxnSp>
         <p:nvCxnSpPr>
-          <p:cNvPr id="38" name="Straight Connector 37">
-            <a:extLst>
-              <a:ext uri="{FF2B5EF4-FFF2-40B4-BE49-F238E27FC236}">
-                <a16:creationId xmlns:a16="http://schemas.microsoft.com/office/drawing/2014/main" id="{57BE9696-8885-0C6F-669F-354414D43CF4}"/>
+          <p:cNvPr id="12" name="Straight Connector 11">
+            <a:extLst>
+              <a:ext uri="{FF2B5EF4-FFF2-40B4-BE49-F238E27FC236}">
+                <a16:creationId xmlns:a16="http://schemas.microsoft.com/office/drawing/2014/main" id="{78BE0281-47BE-136B-D1F4-56FE1E40EBDE}"/>
               </a:ext>
             </a:extLst>
           </p:cNvPr>
           <p:cNvCxnSpPr>
             <a:cxnSpLocks/>
-            <a:stCxn id="8" idx="3"/>
-            <a:endCxn id="29" idx="1"/>
           </p:cNvCxnSpPr>
           <p:nvPr/>
         </p:nvCxnSpPr>
         <p:spPr>
           <a:xfrm flipV="1">
-            <a:off x="3840480" y="1882860"/>
-            <a:ext cx="3344675" cy="2907"/>
+            <a:off x="7207525" y="1885767"/>
+            <a:ext cx="3110901" cy="1051246"/>
           </a:xfrm>
           <a:prstGeom prst="line">
             <a:avLst/>
@@ -5330,74 +4993,89 @@
           </a:fontRef>
         </p:style>
       </p:cxnSp>
-      <p:cxnSp>
-        <p:nvCxnSpPr>
-          <p:cNvPr id="46" name="Straight Connector 45">
-            <a:extLst>
-              <a:ext uri="{FF2B5EF4-FFF2-40B4-BE49-F238E27FC236}">
-                <a16:creationId xmlns:a16="http://schemas.microsoft.com/office/drawing/2014/main" id="{1DDF8D4D-33CF-5729-E3FE-09329D7AF850}"/>
-              </a:ext>
-            </a:extLst>
-          </p:cNvPr>
-          <p:cNvCxnSpPr>
-            <a:cxnSpLocks/>
-            <a:stCxn id="26" idx="3"/>
-            <a:endCxn id="30" idx="1"/>
-          </p:cNvCxnSpPr>
+      <p:sp>
+        <p:nvSpPr>
+          <p:cNvPr id="23" name="Rectangle: Rounded Corners 22">
+            <a:extLst>
+              <a:ext uri="{FF2B5EF4-FFF2-40B4-BE49-F238E27FC236}">
+                <a16:creationId xmlns:a16="http://schemas.microsoft.com/office/drawing/2014/main" id="{443E0865-0CB2-DCC6-B1CB-44E6232DC466}"/>
+              </a:ext>
+            </a:extLst>
+          </p:cNvPr>
+          <p:cNvSpPr/>
           <p:nvPr/>
-        </p:nvCxnSpPr>
-        <p:spPr>
-          <a:xfrm flipV="1">
-            <a:off x="3840480" y="4866636"/>
-            <a:ext cx="3344674" cy="23226"/>
-          </a:xfrm>
-          <a:prstGeom prst="line">
+        </p:nvSpPr>
+        <p:spPr>
+          <a:xfrm>
+            <a:off x="3281616" y="1378855"/>
+            <a:ext cx="1339085" cy="1013824"/>
+          </a:xfrm>
+          <a:prstGeom prst="roundRect">
             <a:avLst/>
           </a:prstGeom>
+          <a:noFill/>
           <a:ln w="31750">
             <a:solidFill>
               <a:schemeClr val="tx1"/>
             </a:solidFill>
-            <a:prstDash val="sysDash"/>
-            <a:headEnd type="triangle" w="med" len="med"/>
-            <a:tailEnd type="triangle" w="med" len="med"/>
           </a:ln>
         </p:spPr>
         <p:style>
-          <a:lnRef idx="1">
-            <a:schemeClr val="accent1"/>
+          <a:lnRef idx="2">
+            <a:schemeClr val="accent1">
+              <a:shade val="50000"/>
+            </a:schemeClr>
           </a:lnRef>
-          <a:fillRef idx="0">
+          <a:fillRef idx="1">
             <a:schemeClr val="accent1"/>
           </a:fillRef>
           <a:effectRef idx="0">
             <a:schemeClr val="accent1"/>
           </a:effectRef>
           <a:fontRef idx="minor">
-            <a:schemeClr val="tx1"/>
+            <a:schemeClr val="lt1"/>
           </a:fontRef>
         </p:style>
-      </p:cxnSp>
+        <p:txBody>
+          <a:bodyPr rtlCol="0" anchor="ctr"/>
+          <a:lstStyle/>
+          <a:p>
+            <a:pPr algn="ctr"/>
+            <a:r>
+              <a:rPr lang="en-US" dirty="0" err="1">
+                <a:solidFill>
+                  <a:schemeClr val="tx1"/>
+                </a:solidFill>
+              </a:rPr>
+              <a:t>CartThunk</a:t>
+            </a:r>
+            <a:endParaRPr lang="en-US" dirty="0">
+              <a:solidFill>
+                <a:schemeClr val="tx1"/>
+              </a:solidFill>
+            </a:endParaRPr>
+          </a:p>
+        </p:txBody>
+      </p:sp>
       <p:cxnSp>
         <p:nvCxnSpPr>
-          <p:cNvPr id="50" name="Straight Connector 49">
-            <a:extLst>
-              <a:ext uri="{FF2B5EF4-FFF2-40B4-BE49-F238E27FC236}">
-                <a16:creationId xmlns:a16="http://schemas.microsoft.com/office/drawing/2014/main" id="{C1FE4413-0F93-A874-E586-33BA99418BD5}"/>
+          <p:cNvPr id="37" name="Straight Connector 36">
+            <a:extLst>
+              <a:ext uri="{FF2B5EF4-FFF2-40B4-BE49-F238E27FC236}">
+                <a16:creationId xmlns:a16="http://schemas.microsoft.com/office/drawing/2014/main" id="{D6110F3A-A9AE-7445-1E1D-0BDC2C36C2AF}"/>
               </a:ext>
             </a:extLst>
           </p:cNvPr>
           <p:cNvCxnSpPr>
             <a:cxnSpLocks/>
-            <a:stCxn id="29" idx="3"/>
-            <a:endCxn id="31" idx="1"/>
+            <a:endCxn id="26" idx="3"/>
           </p:cNvCxnSpPr>
           <p:nvPr/>
         </p:nvCxnSpPr>
         <p:spPr>
-          <a:xfrm>
-            <a:off x="8524240" y="1882860"/>
-            <a:ext cx="1365511" cy="509819"/>
+          <a:xfrm flipH="1">
+            <a:off x="4620701" y="3429000"/>
+            <a:ext cx="1247739" cy="1460862"/>
           </a:xfrm>
           <a:prstGeom prst="line">
             <a:avLst/>
@@ -5427,24 +5105,24 @@
       </p:cxnSp>
       <p:cxnSp>
         <p:nvCxnSpPr>
-          <p:cNvPr id="54" name="Straight Connector 53">
-            <a:extLst>
-              <a:ext uri="{FF2B5EF4-FFF2-40B4-BE49-F238E27FC236}">
-                <a16:creationId xmlns:a16="http://schemas.microsoft.com/office/drawing/2014/main" id="{5E1481CA-1335-108F-1530-5562D5669FF6}"/>
+          <p:cNvPr id="44" name="Straight Connector 43">
+            <a:extLst>
+              <a:ext uri="{FF2B5EF4-FFF2-40B4-BE49-F238E27FC236}">
+                <a16:creationId xmlns:a16="http://schemas.microsoft.com/office/drawing/2014/main" id="{5F0D4ED6-F7A9-5BDE-8B94-3629BB582622}"/>
               </a:ext>
             </a:extLst>
           </p:cNvPr>
           <p:cNvCxnSpPr>
             <a:cxnSpLocks/>
-            <a:stCxn id="29" idx="3"/>
-            <a:endCxn id="32" idx="1"/>
+            <a:stCxn id="26" idx="1"/>
+            <a:endCxn id="25" idx="3"/>
           </p:cNvCxnSpPr>
           <p:nvPr/>
         </p:nvCxnSpPr>
         <p:spPr>
-          <a:xfrm>
-            <a:off x="8524240" y="1882860"/>
-            <a:ext cx="1365511" cy="1813563"/>
+          <a:xfrm flipH="1">
+            <a:off x="2445025" y="4889862"/>
+            <a:ext cx="836591" cy="1"/>
           </a:xfrm>
           <a:prstGeom prst="line">
             <a:avLst/>
@@ -5474,24 +5152,22 @@
       </p:cxnSp>
       <p:cxnSp>
         <p:nvCxnSpPr>
-          <p:cNvPr id="60" name="Straight Connector 59">
-            <a:extLst>
-              <a:ext uri="{FF2B5EF4-FFF2-40B4-BE49-F238E27FC236}">
-                <a16:creationId xmlns:a16="http://schemas.microsoft.com/office/drawing/2014/main" id="{AB1C1416-7D1E-D51D-67C2-7AD3011342E9}"/>
+          <p:cNvPr id="58" name="Straight Connector 57">
+            <a:extLst>
+              <a:ext uri="{FF2B5EF4-FFF2-40B4-BE49-F238E27FC236}">
+                <a16:creationId xmlns:a16="http://schemas.microsoft.com/office/drawing/2014/main" id="{21B7CA6A-E1C3-17FB-8C65-DD54CA588325}"/>
               </a:ext>
             </a:extLst>
           </p:cNvPr>
           <p:cNvCxnSpPr>
             <a:cxnSpLocks/>
-            <a:stCxn id="30" idx="3"/>
-            <a:endCxn id="32" idx="1"/>
           </p:cNvCxnSpPr>
           <p:nvPr/>
         </p:nvCxnSpPr>
         <p:spPr>
-          <a:xfrm flipV="1">
-            <a:off x="8524239" y="3696423"/>
-            <a:ext cx="1365512" cy="1170213"/>
+          <a:xfrm>
+            <a:off x="7207525" y="3389243"/>
+            <a:ext cx="3110901" cy="1292087"/>
           </a:xfrm>
           <a:prstGeom prst="line">
             <a:avLst/>
@@ -5500,8 +5176,9 @@
             <a:solidFill>
               <a:schemeClr val="tx1"/>
             </a:solidFill>
+            <a:prstDash val="sysDash"/>
             <a:headEnd type="triangle" w="med" len="med"/>
-            <a:tailEnd type="triangle" w="med" len="med"/>
+            <a:tailEnd type="none" w="med" len="med"/>
           </a:ln>
         </p:spPr>
         <p:style>

</xml_diff>